<commit_message>
update ppt, update doc, check functions
</commit_message>
<xml_diff>
--- a/tables_and_figures.pptx
+++ b/tables_and_figures.pptx
@@ -5,14 +5,15 @@
     <p:sldMasterId id="2147483648" r:id="rId3"/>
   </p:sldMasterIdLst>
   <p:notesMasterIdLst>
-    <p:notesMasterId r:id="rId9"/>
+    <p:notesMasterId r:id="rId10"/>
   </p:notesMasterIdLst>
   <p:sldIdLst>
     <p:sldId id="330" r:id="rId4"/>
     <p:sldId id="312" r:id="rId5"/>
     <p:sldId id="331" r:id="rId6"/>
-    <p:sldId id="333" r:id="rId7"/>
-    <p:sldId id="332" r:id="rId8"/>
+    <p:sldId id="334" r:id="rId7"/>
+    <p:sldId id="333" r:id="rId8"/>
+    <p:sldId id="332" r:id="rId9"/>
   </p:sldIdLst>
   <p:sldSz cx="24384000" cy="13716000"/>
   <p:notesSz cx="6858000" cy="9144000"/>
@@ -729,6 +730,90 @@
         <p:cNvPr id="1" name="">
           <a:extLst>
             <a:ext uri="{FF2B5EF4-FFF2-40B4-BE49-F238E27FC236}">
+              <a16:creationId xmlns:a16="http://schemas.microsoft.com/office/drawing/2014/main" id="{A1ADAA6F-6761-60C0-9304-1BD5811210B9}"/>
+            </a:ext>
+          </a:extLst>
+        </p:cNvPr>
+        <p:cNvGrpSpPr/>
+        <p:nvPr/>
+      </p:nvGrpSpPr>
+      <p:grpSpPr>
+        <a:xfrm>
+          <a:off x="0" y="0"/>
+          <a:ext cx="0" cy="0"/>
+          <a:chOff x="0" y="0"/>
+          <a:chExt cx="0" cy="0"/>
+        </a:xfrm>
+      </p:grpSpPr>
+      <p:sp>
+        <p:nvSpPr>
+          <p:cNvPr id="2" name="Slide Image Placeholder 1">
+            <a:extLst>
+              <a:ext uri="{FF2B5EF4-FFF2-40B4-BE49-F238E27FC236}">
+                <a16:creationId xmlns:a16="http://schemas.microsoft.com/office/drawing/2014/main" id="{979BF774-8CB5-526C-F6F3-883B49DBA5B0}"/>
+              </a:ext>
+            </a:extLst>
+          </p:cNvPr>
+          <p:cNvSpPr>
+            <a:spLocks noGrp="1" noRot="1" noChangeAspect="1"/>
+          </p:cNvSpPr>
+          <p:nvPr>
+            <p:ph type="sldImg"/>
+          </p:nvPr>
+        </p:nvSpPr>
+        <p:spPr>
+          <a:xfrm>
+            <a:off x="381000" y="685800"/>
+            <a:ext cx="6096000" cy="3429000"/>
+          </a:xfrm>
+        </p:spPr>
+      </p:sp>
+      <p:sp>
+        <p:nvSpPr>
+          <p:cNvPr id="3" name="Notes Placeholder 2">
+            <a:extLst>
+              <a:ext uri="{FF2B5EF4-FFF2-40B4-BE49-F238E27FC236}">
+                <a16:creationId xmlns:a16="http://schemas.microsoft.com/office/drawing/2014/main" id="{581C3B22-9AF4-3476-18DB-B9C2F7260687}"/>
+              </a:ext>
+            </a:extLst>
+          </p:cNvPr>
+          <p:cNvSpPr>
+            <a:spLocks noGrp="1"/>
+          </p:cNvSpPr>
+          <p:nvPr>
+            <p:ph type="body" idx="1"/>
+          </p:nvPr>
+        </p:nvSpPr>
+        <p:spPr/>
+        <p:txBody>
+          <a:bodyPr/>
+          <a:lstStyle/>
+          <a:p>
+            <a:endParaRPr lang="en-GB" dirty="0"/>
+          </a:p>
+        </p:txBody>
+      </p:sp>
+    </p:spTree>
+    <p:extLst>
+      <p:ext uri="{BB962C8B-B14F-4D97-AF65-F5344CB8AC3E}">
+        <p14:creationId xmlns:p14="http://schemas.microsoft.com/office/powerpoint/2010/main" val="3605202108"/>
+      </p:ext>
+    </p:extLst>
+  </p:cSld>
+  <p:clrMapOvr>
+    <a:masterClrMapping/>
+  </p:clrMapOvr>
+</p:notes>
+</file>
+
+<file path=ppt/notesSlides/notesSlide5.xml><?xml version="1.0" encoding="utf-8"?>
+<p:notes xmlns:a="http://schemas.openxmlformats.org/drawingml/2006/main" xmlns:r="http://schemas.openxmlformats.org/officeDocument/2006/relationships" xmlns:p="http://schemas.openxmlformats.org/presentationml/2006/main">
+  <p:cSld>
+    <p:spTree>
+      <p:nvGrpSpPr>
+        <p:cNvPr id="1" name="">
+          <a:extLst>
+            <a:ext uri="{FF2B5EF4-FFF2-40B4-BE49-F238E27FC236}">
               <a16:creationId xmlns:a16="http://schemas.microsoft.com/office/drawing/2014/main" id="{69E75B18-E805-41A8-9C42-35606824A1AA}"/>
             </a:ext>
           </a:extLst>
@@ -805,7 +890,7 @@
 </p:notes>
 </file>
 
-<file path=ppt/notesSlides/notesSlide5.xml><?xml version="1.0" encoding="utf-8"?>
+<file path=ppt/notesSlides/notesSlide6.xml><?xml version="1.0" encoding="utf-8"?>
 <p:notes xmlns:a="http://schemas.openxmlformats.org/drawingml/2006/main" xmlns:r="http://schemas.openxmlformats.org/officeDocument/2006/relationships" xmlns:p="http://schemas.openxmlformats.org/presentationml/2006/main">
   <p:cSld>
     <p:spTree>
@@ -3025,7 +3110,7 @@
           </a:ln>
           <a:extLst>
             <a:ext uri="{C572A759-6A51-4108-AA02-DFA0A04FC94B}">
-              <ma14:wrappingTextBoxFlag xmlns:ma14="http://schemas.microsoft.com/office/mac/drawingml/2011/main" xmlns:a14="http://schemas.microsoft.com/office/drawing/2010/main" xmlns:m="http://schemas.openxmlformats.org/officeDocument/2006/math" xmlns="" val="1"/>
+              <ma14:wrappingTextBoxFlag xmlns="" xmlns:m="http://schemas.openxmlformats.org/officeDocument/2006/math" xmlns:a14="http://schemas.microsoft.com/office/drawing/2010/main" xmlns:ma14="http://schemas.microsoft.com/office/mac/drawingml/2011/main" val="1"/>
             </a:ext>
           </a:extLst>
         </p:spPr>
@@ -3064,7 +3149,7 @@
           </a:ln>
           <a:extLst>
             <a:ext uri="{C572A759-6A51-4108-AA02-DFA0A04FC94B}">
-              <ma14:wrappingTextBoxFlag xmlns:ma14="http://schemas.microsoft.com/office/mac/drawingml/2011/main" xmlns:a14="http://schemas.microsoft.com/office/drawing/2010/main" xmlns:m="http://schemas.openxmlformats.org/officeDocument/2006/math" xmlns="" val="1"/>
+              <ma14:wrappingTextBoxFlag xmlns="" xmlns:m="http://schemas.openxmlformats.org/officeDocument/2006/math" xmlns:a14="http://schemas.microsoft.com/office/drawing/2010/main" xmlns:ma14="http://schemas.microsoft.com/office/mac/drawingml/2011/main" val="1"/>
             </a:ext>
           </a:extLst>
         </p:spPr>
@@ -4015,7 +4100,7 @@
           </a:ln>
           <a:extLst>
             <a:ext uri="{C572A759-6A51-4108-AA02-DFA0A04FC94B}">
-              <ma14:wrappingTextBoxFlag xmlns:ma14="http://schemas.microsoft.com/office/mac/drawingml/2011/main" xmlns:a14="http://schemas.microsoft.com/office/drawing/2010/main" xmlns:m="http://schemas.openxmlformats.org/officeDocument/2006/math" xmlns="" val="1"/>
+              <ma14:wrappingTextBoxFlag xmlns="" xmlns:m="http://schemas.openxmlformats.org/officeDocument/2006/math" xmlns:a14="http://schemas.microsoft.com/office/drawing/2010/main" xmlns:ma14="http://schemas.microsoft.com/office/mac/drawingml/2011/main" val="1"/>
             </a:ext>
           </a:extLst>
         </p:spPr>
@@ -4153,7 +4238,7 @@
             </a:ln>
             <a:extLst>
               <a:ext uri="{C572A759-6A51-4108-AA02-DFA0A04FC94B}">
-                <ma14:wrappingTextBoxFlag xmlns:ma14="http://schemas.microsoft.com/office/mac/drawingml/2011/main" xmlns:a14="http://schemas.microsoft.com/office/drawing/2010/main" xmlns:m="http://schemas.openxmlformats.org/officeDocument/2006/math" xmlns="" val="1"/>
+                <ma14:wrappingTextBoxFlag xmlns="" xmlns:m="http://schemas.openxmlformats.org/officeDocument/2006/math" xmlns:a14="http://schemas.microsoft.com/office/drawing/2010/main" xmlns:ma14="http://schemas.microsoft.com/office/mac/drawingml/2011/main" val="1"/>
               </a:ext>
             </a:extLst>
           </p:spPr>
@@ -4211,7 +4296,7 @@
             </a:ln>
             <a:extLst>
               <a:ext uri="{C572A759-6A51-4108-AA02-DFA0A04FC94B}">
-                <ma14:wrappingTextBoxFlag xmlns:ma14="http://schemas.microsoft.com/office/mac/drawingml/2011/main" xmlns:a14="http://schemas.microsoft.com/office/drawing/2010/main" xmlns:m="http://schemas.openxmlformats.org/officeDocument/2006/math" xmlns="" val="1"/>
+                <ma14:wrappingTextBoxFlag xmlns="" xmlns:m="http://schemas.openxmlformats.org/officeDocument/2006/math" xmlns:a14="http://schemas.microsoft.com/office/drawing/2010/main" xmlns:ma14="http://schemas.microsoft.com/office/mac/drawingml/2011/main" val="1"/>
               </a:ext>
             </a:extLst>
           </p:spPr>
@@ -7184,6 +7269,1012 @@
         <p:cNvPr id="1" name="">
           <a:extLst>
             <a:ext uri="{FF2B5EF4-FFF2-40B4-BE49-F238E27FC236}">
+              <a16:creationId xmlns:a16="http://schemas.microsoft.com/office/drawing/2014/main" id="{6DBCF21C-018B-9B58-0E75-E2D6EDC9A133}"/>
+            </a:ext>
+          </a:extLst>
+        </p:cNvPr>
+        <p:cNvGrpSpPr/>
+        <p:nvPr/>
+      </p:nvGrpSpPr>
+      <p:grpSpPr>
+        <a:xfrm>
+          <a:off x="0" y="0"/>
+          <a:ext cx="0" cy="0"/>
+          <a:chOff x="0" y="0"/>
+          <a:chExt cx="0" cy="0"/>
+        </a:xfrm>
+      </p:grpSpPr>
+      <p:sp>
+        <p:nvSpPr>
+          <p:cNvPr id="2" name="Title 1">
+            <a:extLst>
+              <a:ext uri="{FF2B5EF4-FFF2-40B4-BE49-F238E27FC236}">
+                <a16:creationId xmlns:a16="http://schemas.microsoft.com/office/drawing/2014/main" id="{EDE55413-E860-BFCE-2708-9FC44466A3E3}"/>
+              </a:ext>
+            </a:extLst>
+          </p:cNvPr>
+          <p:cNvSpPr>
+            <a:spLocks noGrp="1"/>
+          </p:cNvSpPr>
+          <p:nvPr>
+            <p:ph type="title"/>
+          </p:nvPr>
+        </p:nvSpPr>
+        <p:spPr>
+          <a:xfrm>
+            <a:off x="841364" y="924247"/>
+            <a:ext cx="23313845" cy="1662592"/>
+          </a:xfrm>
+          <a:noFill/>
+          <a:ln>
+            <a:noFill/>
+          </a:ln>
+        </p:spPr>
+        <p:txBody>
+          <a:bodyPr>
+            <a:normAutofit/>
+          </a:bodyPr>
+          <a:lstStyle/>
+          <a:p>
+            <a:pPr>
+              <a:lnSpc>
+                <a:spcPct val="100000"/>
+              </a:lnSpc>
+            </a:pPr>
+            <a:r>
+              <a:rPr lang="en-GB" sz="8000" dirty="0">
+                <a:solidFill>
+                  <a:srgbClr val="5A72ED"/>
+                </a:solidFill>
+                <a:latin typeface="Montserrat" pitchFamily="2" charset="77"/>
+              </a:rPr>
+              <a:t>Dot Balance Metrics</a:t>
+            </a:r>
+          </a:p>
+        </p:txBody>
+      </p:sp>
+      <p:pic>
+        <p:nvPicPr>
+          <p:cNvPr id="4" name="Picture 3">
+            <a:extLst>
+              <a:ext uri="{FF2B5EF4-FFF2-40B4-BE49-F238E27FC236}">
+                <a16:creationId xmlns:a16="http://schemas.microsoft.com/office/drawing/2014/main" id="{3E2F660D-3519-BBA5-1229-2BD020FC4D88}"/>
+              </a:ext>
+            </a:extLst>
+          </p:cNvPr>
+          <p:cNvPicPr>
+            <a:picLocks noChangeAspect="1"/>
+          </p:cNvPicPr>
+          <p:nvPr/>
+        </p:nvPicPr>
+        <p:blipFill>
+          <a:blip r:embed="rId3" cstate="print">
+            <a:extLst>
+              <a:ext uri="{28A0092B-C50C-407E-A947-70E740481C1C}">
+                <a14:useLocalDpi xmlns:a14="http://schemas.microsoft.com/office/drawing/2010/main" val="0"/>
+              </a:ext>
+            </a:extLst>
+          </a:blip>
+          <a:srcRect/>
+          <a:stretch>
+            <a:fillRect/>
+          </a:stretch>
+        </p:blipFill>
+        <p:spPr bwMode="auto">
+          <a:xfrm>
+            <a:off x="21604942" y="12897018"/>
+            <a:ext cx="2004452" cy="539660"/>
+          </a:xfrm>
+          <a:prstGeom prst="rect">
+            <a:avLst/>
+          </a:prstGeom>
+          <a:noFill/>
+          <a:ln>
+            <a:noFill/>
+          </a:ln>
+        </p:spPr>
+      </p:pic>
+      <p:pic>
+        <p:nvPicPr>
+          <p:cNvPr id="3" name="Graphic 2">
+            <a:extLst>
+              <a:ext uri="{FF2B5EF4-FFF2-40B4-BE49-F238E27FC236}">
+                <a16:creationId xmlns:a16="http://schemas.microsoft.com/office/drawing/2014/main" id="{D2171A63-45C1-7135-CB7A-AFCF152A470B}"/>
+              </a:ext>
+            </a:extLst>
+          </p:cNvPr>
+          <p:cNvPicPr>
+            <a:picLocks noChangeAspect="1"/>
+          </p:cNvPicPr>
+          <p:nvPr/>
+        </p:nvPicPr>
+        <p:blipFill>
+          <a:blip r:embed="rId4">
+            <a:extLst>
+              <a:ext uri="{28A0092B-C50C-407E-A947-70E740481C1C}">
+                <a14:useLocalDpi xmlns:a14="http://schemas.microsoft.com/office/drawing/2010/main" val="0"/>
+              </a:ext>
+              <a:ext uri="{96DAC541-7B7A-43D3-8B79-37D633B846F1}">
+                <asvg:svgBlip xmlns:asvg="http://schemas.microsoft.com/office/drawing/2016/SVG/main" r:embed="rId5"/>
+              </a:ext>
+            </a:extLst>
+          </a:blip>
+          <a:stretch>
+            <a:fillRect/>
+          </a:stretch>
+        </p:blipFill>
+        <p:spPr>
+          <a:xfrm>
+            <a:off x="262961" y="12782082"/>
+            <a:ext cx="3315126" cy="655085"/>
+          </a:xfrm>
+          <a:prstGeom prst="rect">
+            <a:avLst/>
+          </a:prstGeom>
+        </p:spPr>
+      </p:pic>
+      <p:sp>
+        <p:nvSpPr>
+          <p:cNvPr id="5" name="Rectangle 1">
+            <a:extLst>
+              <a:ext uri="{FF2B5EF4-FFF2-40B4-BE49-F238E27FC236}">
+                <a16:creationId xmlns:a16="http://schemas.microsoft.com/office/drawing/2014/main" id="{5E90C483-3CC0-D3B2-12B8-32F05F353AE2}"/>
+              </a:ext>
+            </a:extLst>
+          </p:cNvPr>
+          <p:cNvSpPr>
+            <a:spLocks noChangeArrowheads="1"/>
+          </p:cNvSpPr>
+          <p:nvPr/>
+        </p:nvSpPr>
+        <p:spPr bwMode="auto">
+          <a:xfrm>
+            <a:off x="841364" y="7527858"/>
+            <a:ext cx="9177279" cy="307777"/>
+          </a:xfrm>
+          <a:prstGeom prst="rect">
+            <a:avLst/>
+          </a:prstGeom>
+          <a:solidFill>
+            <a:srgbClr val="FFFFFF"/>
+          </a:solidFill>
+          <a:ln>
+            <a:noFill/>
+          </a:ln>
+          <a:effectLst/>
+          <a:extLst>
+            <a:ext uri="{91240B29-F687-4F45-9708-019B960494DF}">
+              <a14:hiddenLine xmlns:a14="http://schemas.microsoft.com/office/drawing/2010/main" w="9525">
+                <a:solidFill>
+                  <a:schemeClr val="tx1"/>
+                </a:solidFill>
+                <a:miter lim="800000"/>
+                <a:headEnd/>
+                <a:tailEnd/>
+              </a14:hiddenLine>
+            </a:ext>
+            <a:ext uri="{AF507438-7753-43E0-B8FC-AC1667EBCBE1}">
+              <a14:hiddenEffects xmlns:a14="http://schemas.microsoft.com/office/drawing/2010/main">
+                <a:effectLst>
+                  <a:outerShdw dist="35921" dir="2700000" algn="ctr" rotWithShape="0">
+                    <a:schemeClr val="bg2"/>
+                  </a:outerShdw>
+                </a:effectLst>
+              </a14:hiddenEffects>
+            </a:ext>
+          </a:extLst>
+        </p:spPr>
+        <p:txBody>
+          <a:bodyPr vert="horz" wrap="square" lIns="0" tIns="0" rIns="0" bIns="0" numCol="1" anchor="ctr" anchorCtr="0" compatLnSpc="1">
+            <a:prstTxWarp prst="textNoShape">
+              <a:avLst/>
+            </a:prstTxWarp>
+            <a:spAutoFit/>
+          </a:bodyPr>
+          <a:lstStyle/>
+          <a:p>
+            <a:pPr marL="0" marR="0" lvl="0" indent="0" algn="l" defTabSz="914400" rtl="0" eaLnBrk="0" fontAlgn="base" latinLnBrk="0" hangingPunct="0">
+              <a:lnSpc>
+                <a:spcPct val="100000"/>
+              </a:lnSpc>
+              <a:spcBef>
+                <a:spcPct val="0"/>
+              </a:spcBef>
+              <a:spcAft>
+                <a:spcPct val="0"/>
+              </a:spcAft>
+              <a:buClrTx/>
+              <a:buSzTx/>
+              <a:buFontTx/>
+              <a:buNone/>
+              <a:tabLst/>
+            </a:pPr>
+            <a:endParaRPr kumimoji="0" lang="en-US" altLang="en-US" sz="2000" b="0" i="0" u="none" strike="noStrike" cap="none" normalizeH="0" baseline="0" dirty="0">
+              <a:ln>
+                <a:noFill/>
+              </a:ln>
+              <a:solidFill>
+                <a:schemeClr val="tx1"/>
+              </a:solidFill>
+              <a:effectLst/>
+              <a:latin typeface="Montserrat" pitchFamily="2" charset="0"/>
+            </a:endParaRPr>
+          </a:p>
+        </p:txBody>
+      </p:sp>
+      <p:sp>
+        <p:nvSpPr>
+          <p:cNvPr id="6" name="TextBox 5">
+            <a:extLst>
+              <a:ext uri="{FF2B5EF4-FFF2-40B4-BE49-F238E27FC236}">
+                <a16:creationId xmlns:a16="http://schemas.microsoft.com/office/drawing/2014/main" id="{9F5AD80D-DC87-56DD-85DC-FB0DC487503F}"/>
+              </a:ext>
+            </a:extLst>
+          </p:cNvPr>
+          <p:cNvSpPr txBox="1"/>
+          <p:nvPr/>
+        </p:nvSpPr>
+        <p:spPr>
+          <a:xfrm>
+            <a:off x="788430" y="2704641"/>
+            <a:ext cx="5579314" cy="471924"/>
+          </a:xfrm>
+          <a:prstGeom prst="rect">
+            <a:avLst/>
+          </a:prstGeom>
+          <a:noFill/>
+          <a:ln w="12700" cap="flat">
+            <a:noFill/>
+            <a:miter lim="400000"/>
+          </a:ln>
+          <a:effectLst/>
+          <a:sp3d/>
+        </p:spPr>
+        <p:style>
+          <a:lnRef idx="0">
+            <a:scrgbClr r="0" g="0" b="0"/>
+          </a:lnRef>
+          <a:fillRef idx="0">
+            <a:scrgbClr r="0" g="0" b="0"/>
+          </a:fillRef>
+          <a:effectRef idx="0">
+            <a:scrgbClr r="0" g="0" b="0"/>
+          </a:effectRef>
+          <a:fontRef idx="none"/>
+        </p:style>
+        <p:txBody>
+          <a:bodyPr rot="0" spcFirstLastPara="1" vertOverflow="overflow" horzOverflow="overflow" vert="horz" wrap="square" lIns="50800" tIns="50800" rIns="50800" bIns="50800" numCol="1" spcCol="38100" rtlCol="0" anchor="ctr">
+            <a:spAutoFit/>
+          </a:bodyPr>
+          <a:lstStyle/>
+          <a:p>
+            <a:pPr marL="0" marR="0" indent="0" algn="l" defTabSz="2438338" rtl="0" fontAlgn="auto" latinLnBrk="0" hangingPunct="0">
+              <a:lnSpc>
+                <a:spcPct val="100000"/>
+              </a:lnSpc>
+              <a:spcBef>
+                <a:spcPts val="0"/>
+              </a:spcBef>
+              <a:spcAft>
+                <a:spcPts val="0"/>
+              </a:spcAft>
+              <a:buClrTx/>
+              <a:buSzTx/>
+              <a:buFontTx/>
+              <a:buNone/>
+              <a:tabLst/>
+            </a:pPr>
+            <a:r>
+              <a:rPr kumimoji="0" lang="en-US" sz="2400" b="0" i="0" u="none" strike="noStrike" cap="none" spc="0" normalizeH="0" baseline="0" dirty="0">
+                <a:ln>
+                  <a:noFill/>
+                </a:ln>
+                <a:solidFill>
+                  <a:srgbClr val="5E5E5E"/>
+                </a:solidFill>
+                <a:effectLst/>
+                <a:uFillTx/>
+                <a:latin typeface="+mn-lt"/>
+                <a:ea typeface="+mn-ea"/>
+                <a:cs typeface="+mn-cs"/>
+                <a:sym typeface="Helvetica Neue"/>
+              </a:rPr>
+              <a:t>Experimenter 1</a:t>
+            </a:r>
+          </a:p>
+        </p:txBody>
+      </p:sp>
+      <p:sp>
+        <p:nvSpPr>
+          <p:cNvPr id="8" name="TextBox 7">
+            <a:extLst>
+              <a:ext uri="{FF2B5EF4-FFF2-40B4-BE49-F238E27FC236}">
+                <a16:creationId xmlns:a16="http://schemas.microsoft.com/office/drawing/2014/main" id="{E1357FFA-FA9B-3772-7B25-AF75D6CD917E}"/>
+              </a:ext>
+            </a:extLst>
+          </p:cNvPr>
+          <p:cNvSpPr txBox="1"/>
+          <p:nvPr/>
+        </p:nvSpPr>
+        <p:spPr>
+          <a:xfrm>
+            <a:off x="10621543" y="2704641"/>
+            <a:ext cx="5579314" cy="471924"/>
+          </a:xfrm>
+          <a:prstGeom prst="rect">
+            <a:avLst/>
+          </a:prstGeom>
+          <a:noFill/>
+          <a:ln w="12700" cap="flat">
+            <a:noFill/>
+            <a:miter lim="400000"/>
+          </a:ln>
+          <a:effectLst/>
+          <a:sp3d/>
+        </p:spPr>
+        <p:style>
+          <a:lnRef idx="0">
+            <a:scrgbClr r="0" g="0" b="0"/>
+          </a:lnRef>
+          <a:fillRef idx="0">
+            <a:scrgbClr r="0" g="0" b="0"/>
+          </a:fillRef>
+          <a:effectRef idx="0">
+            <a:scrgbClr r="0" g="0" b="0"/>
+          </a:effectRef>
+          <a:fontRef idx="none"/>
+        </p:style>
+        <p:txBody>
+          <a:bodyPr rot="0" spcFirstLastPara="1" vertOverflow="overflow" horzOverflow="overflow" vert="horz" wrap="square" lIns="50800" tIns="50800" rIns="50800" bIns="50800" numCol="1" spcCol="38100" rtlCol="0" anchor="ctr">
+            <a:spAutoFit/>
+          </a:bodyPr>
+          <a:lstStyle/>
+          <a:p>
+            <a:pPr marL="0" marR="0" indent="0" algn="l" defTabSz="2438338" rtl="0" fontAlgn="auto" latinLnBrk="0" hangingPunct="0">
+              <a:lnSpc>
+                <a:spcPct val="100000"/>
+              </a:lnSpc>
+              <a:spcBef>
+                <a:spcPts val="0"/>
+              </a:spcBef>
+              <a:spcAft>
+                <a:spcPts val="0"/>
+              </a:spcAft>
+              <a:buClrTx/>
+              <a:buSzTx/>
+              <a:buFontTx/>
+              <a:buNone/>
+              <a:tabLst/>
+            </a:pPr>
+            <a:r>
+              <a:rPr kumimoji="0" lang="en-US" sz="2400" b="0" i="0" u="none" strike="noStrike" cap="none" spc="0" normalizeH="0" baseline="0" dirty="0">
+                <a:ln>
+                  <a:noFill/>
+                </a:ln>
+                <a:solidFill>
+                  <a:srgbClr val="5E5E5E"/>
+                </a:solidFill>
+                <a:effectLst/>
+                <a:uFillTx/>
+                <a:latin typeface="+mn-lt"/>
+                <a:ea typeface="+mn-ea"/>
+                <a:cs typeface="+mn-cs"/>
+                <a:sym typeface="Helvetica Neue"/>
+              </a:rPr>
+              <a:t>Experimenter 2</a:t>
+            </a:r>
+          </a:p>
+        </p:txBody>
+      </p:sp>
+      <p:sp>
+        <p:nvSpPr>
+          <p:cNvPr id="7" name="Rectangle 1">
+            <a:extLst>
+              <a:ext uri="{FF2B5EF4-FFF2-40B4-BE49-F238E27FC236}">
+                <a16:creationId xmlns:a16="http://schemas.microsoft.com/office/drawing/2014/main" id="{3C209A15-EBC6-7D68-3983-C5E3F74CA8C1}"/>
+              </a:ext>
+            </a:extLst>
+          </p:cNvPr>
+          <p:cNvSpPr>
+            <a:spLocks noChangeArrowheads="1"/>
+          </p:cNvSpPr>
+          <p:nvPr/>
+        </p:nvSpPr>
+        <p:spPr bwMode="auto">
+          <a:xfrm>
+            <a:off x="841364" y="3456668"/>
+            <a:ext cx="6573227" cy="2154436"/>
+          </a:xfrm>
+          <a:prstGeom prst="rect">
+            <a:avLst/>
+          </a:prstGeom>
+          <a:solidFill>
+            <a:srgbClr val="FFFFFF"/>
+          </a:solidFill>
+          <a:ln>
+            <a:noFill/>
+          </a:ln>
+          <a:effectLst/>
+          <a:extLst>
+            <a:ext uri="{91240B29-F687-4F45-9708-019B960494DF}">
+              <a14:hiddenLine xmlns:a14="http://schemas.microsoft.com/office/drawing/2010/main" w="9525">
+                <a:solidFill>
+                  <a:schemeClr val="tx1"/>
+                </a:solidFill>
+                <a:miter lim="800000"/>
+                <a:headEnd/>
+                <a:tailEnd/>
+              </a14:hiddenLine>
+            </a:ext>
+            <a:ext uri="{AF507438-7753-43E0-B8FC-AC1667EBCBE1}">
+              <a14:hiddenEffects xmlns:a14="http://schemas.microsoft.com/office/drawing/2010/main">
+                <a:effectLst>
+                  <a:outerShdw dist="35921" dir="2700000" algn="ctr" rotWithShape="0">
+                    <a:schemeClr val="bg2"/>
+                  </a:outerShdw>
+                </a:effectLst>
+              </a14:hiddenEffects>
+            </a:ext>
+          </a:extLst>
+        </p:spPr>
+        <p:txBody>
+          <a:bodyPr vert="horz" wrap="square" lIns="0" tIns="0" rIns="0" bIns="0" numCol="1" anchor="ctr" anchorCtr="0" compatLnSpc="1">
+            <a:prstTxWarp prst="textNoShape">
+              <a:avLst/>
+            </a:prstTxWarp>
+            <a:spAutoFit/>
+          </a:bodyPr>
+          <a:lstStyle/>
+          <a:p>
+            <a:pPr marL="0" marR="0" lvl="0" indent="0" algn="l" defTabSz="914400" rtl="0" eaLnBrk="0" fontAlgn="base" latinLnBrk="0" hangingPunct="0">
+              <a:lnSpc>
+                <a:spcPct val="100000"/>
+              </a:lnSpc>
+              <a:spcBef>
+                <a:spcPct val="0"/>
+              </a:spcBef>
+              <a:spcAft>
+                <a:spcPct val="0"/>
+              </a:spcAft>
+              <a:buClrTx/>
+              <a:buSzTx/>
+              <a:buFontTx/>
+              <a:buNone/>
+              <a:tabLst/>
+            </a:pPr>
+            <a:r>
+              <a:rPr kumimoji="0" lang="en-US" altLang="en-US" sz="2000" b="0" i="0" u="none" strike="noStrike" cap="none" normalizeH="0" baseline="0" dirty="0">
+                <a:ln>
+                  <a:noFill/>
+                </a:ln>
+                <a:solidFill>
+                  <a:schemeClr val="tx1"/>
+                </a:solidFill>
+                <a:effectLst/>
+                <a:latin typeface="Montserrat" pitchFamily="2" charset="0"/>
+              </a:rPr>
+              <a:t>Baseline </a:t>
+            </a:r>
+          </a:p>
+          <a:p>
+            <a:pPr marL="0" marR="0" lvl="0" indent="0" algn="l" defTabSz="914400" rtl="0" eaLnBrk="0" fontAlgn="base" latinLnBrk="0" hangingPunct="0">
+              <a:lnSpc>
+                <a:spcPct val="100000"/>
+              </a:lnSpc>
+              <a:spcBef>
+                <a:spcPct val="0"/>
+              </a:spcBef>
+              <a:spcAft>
+                <a:spcPct val="0"/>
+              </a:spcAft>
+              <a:buClrTx/>
+              <a:buSzTx/>
+              <a:buFontTx/>
+              <a:buNone/>
+              <a:tabLst/>
+            </a:pPr>
+            <a:r>
+              <a:rPr lang="en-US" altLang="en-US" sz="2000" dirty="0">
+                <a:solidFill>
+                  <a:schemeClr val="tx1"/>
+                </a:solidFill>
+                <a:latin typeface="Montserrat" pitchFamily="2" charset="0"/>
+              </a:rPr>
+              <a:t>Shoes: </a:t>
+            </a:r>
+            <a:r>
+              <a:rPr kumimoji="0" lang="en-US" altLang="en-US" sz="2000" b="0" i="0" u="none" strike="noStrike" cap="none" normalizeH="0" baseline="0" dirty="0">
+                <a:ln>
+                  <a:noFill/>
+                </a:ln>
+                <a:solidFill>
+                  <a:schemeClr val="tx1"/>
+                </a:solidFill>
+                <a:effectLst/>
+                <a:latin typeface="Montserrat" pitchFamily="2" charset="0"/>
+              </a:rPr>
+              <a:t>47.69 52.31 </a:t>
+            </a:r>
+          </a:p>
+          <a:p>
+            <a:pPr marL="0" marR="0" lvl="0" indent="0" algn="l" defTabSz="914400" rtl="0" eaLnBrk="0" fontAlgn="base" latinLnBrk="0" hangingPunct="0">
+              <a:lnSpc>
+                <a:spcPct val="100000"/>
+              </a:lnSpc>
+              <a:spcBef>
+                <a:spcPct val="0"/>
+              </a:spcBef>
+              <a:spcAft>
+                <a:spcPct val="0"/>
+              </a:spcAft>
+              <a:buClrTx/>
+              <a:buSzTx/>
+              <a:buFontTx/>
+              <a:buNone/>
+              <a:tabLst/>
+            </a:pPr>
+            <a:r>
+              <a:rPr kumimoji="0" lang="en-US" altLang="en-US" sz="2000" b="0" i="0" u="none" strike="noStrike" cap="none" normalizeH="0" baseline="0" dirty="0">
+                <a:ln>
+                  <a:noFill/>
+                </a:ln>
+                <a:solidFill>
+                  <a:schemeClr val="tx1"/>
+                </a:solidFill>
+                <a:effectLst/>
+                <a:latin typeface="Montserrat" pitchFamily="2" charset="0"/>
+              </a:rPr>
+              <a:t>Barefoot: 46.52 53.48 </a:t>
+            </a:r>
+          </a:p>
+          <a:p>
+            <a:pPr marL="0" marR="0" lvl="0" indent="0" algn="l" defTabSz="914400" rtl="0" eaLnBrk="0" fontAlgn="base" latinLnBrk="0" hangingPunct="0">
+              <a:lnSpc>
+                <a:spcPct val="100000"/>
+              </a:lnSpc>
+              <a:spcBef>
+                <a:spcPct val="0"/>
+              </a:spcBef>
+              <a:spcAft>
+                <a:spcPct val="0"/>
+              </a:spcAft>
+              <a:buClrTx/>
+              <a:buSzTx/>
+              <a:buFontTx/>
+              <a:buNone/>
+              <a:tabLst/>
+            </a:pPr>
+            <a:endParaRPr lang="en-US" altLang="en-US" sz="2000" dirty="0">
+              <a:solidFill>
+                <a:schemeClr val="tx1"/>
+              </a:solidFill>
+              <a:latin typeface="Montserrat" pitchFamily="2" charset="0"/>
+            </a:endParaRPr>
+          </a:p>
+          <a:p>
+            <a:pPr marL="0" marR="0" lvl="0" indent="0" algn="l" defTabSz="914400" rtl="0" eaLnBrk="0" fontAlgn="base" latinLnBrk="0" hangingPunct="0">
+              <a:lnSpc>
+                <a:spcPct val="100000"/>
+              </a:lnSpc>
+              <a:spcBef>
+                <a:spcPct val="0"/>
+              </a:spcBef>
+              <a:spcAft>
+                <a:spcPct val="0"/>
+              </a:spcAft>
+              <a:buClrTx/>
+              <a:buSzTx/>
+              <a:buFontTx/>
+              <a:buNone/>
+              <a:tabLst/>
+            </a:pPr>
+            <a:r>
+              <a:rPr kumimoji="0" lang="en-US" altLang="en-US" sz="2000" b="0" i="0" u="none" strike="noStrike" cap="none" normalizeH="0" baseline="0" dirty="0">
+                <a:ln>
+                  <a:noFill/>
+                </a:ln>
+                <a:solidFill>
+                  <a:schemeClr val="tx1"/>
+                </a:solidFill>
+                <a:effectLst/>
+                <a:latin typeface="Montserrat" pitchFamily="2" charset="0"/>
+              </a:rPr>
+              <a:t>Flight </a:t>
+            </a:r>
+          </a:p>
+          <a:p>
+            <a:pPr marL="0" marR="0" lvl="0" indent="0" algn="l" defTabSz="914400" rtl="0" eaLnBrk="0" fontAlgn="base" latinLnBrk="0" hangingPunct="0">
+              <a:lnSpc>
+                <a:spcPct val="100000"/>
+              </a:lnSpc>
+              <a:spcBef>
+                <a:spcPct val="0"/>
+              </a:spcBef>
+              <a:spcAft>
+                <a:spcPct val="0"/>
+              </a:spcAft>
+              <a:buClrTx/>
+              <a:buSzTx/>
+              <a:buFontTx/>
+              <a:buNone/>
+              <a:tabLst/>
+            </a:pPr>
+            <a:r>
+              <a:rPr kumimoji="0" lang="en-US" altLang="en-US" sz="2000" b="0" i="0" u="none" strike="noStrike" cap="none" normalizeH="0" baseline="0" dirty="0">
+                <a:ln>
+                  <a:noFill/>
+                </a:ln>
+                <a:solidFill>
+                  <a:schemeClr val="tx1"/>
+                </a:solidFill>
+                <a:effectLst/>
+                <a:latin typeface="Montserrat" pitchFamily="2" charset="0"/>
+              </a:rPr>
+              <a:t>Shoes: 48.98 51.02 </a:t>
+            </a:r>
+          </a:p>
+          <a:p>
+            <a:pPr marL="0" marR="0" lvl="0" indent="0" algn="l" defTabSz="914400" rtl="0" eaLnBrk="0" fontAlgn="base" latinLnBrk="0" hangingPunct="0">
+              <a:lnSpc>
+                <a:spcPct val="100000"/>
+              </a:lnSpc>
+              <a:spcBef>
+                <a:spcPct val="0"/>
+              </a:spcBef>
+              <a:spcAft>
+                <a:spcPct val="0"/>
+              </a:spcAft>
+              <a:buClrTx/>
+              <a:buSzTx/>
+              <a:buFontTx/>
+              <a:buNone/>
+              <a:tabLst/>
+            </a:pPr>
+            <a:r>
+              <a:rPr kumimoji="0" lang="en-US" altLang="en-US" sz="2000" b="0" i="0" u="none" strike="noStrike" cap="none" normalizeH="0" baseline="0" dirty="0">
+                <a:ln>
+                  <a:noFill/>
+                </a:ln>
+                <a:solidFill>
+                  <a:schemeClr val="tx1"/>
+                </a:solidFill>
+                <a:effectLst/>
+                <a:latin typeface="Montserrat" pitchFamily="2" charset="0"/>
+              </a:rPr>
+              <a:t>Barefoot: 49.16 50.84 </a:t>
+            </a:r>
+          </a:p>
+        </p:txBody>
+      </p:sp>
+      <p:sp>
+        <p:nvSpPr>
+          <p:cNvPr id="9" name="Rectangle 2">
+            <a:extLst>
+              <a:ext uri="{FF2B5EF4-FFF2-40B4-BE49-F238E27FC236}">
+                <a16:creationId xmlns:a16="http://schemas.microsoft.com/office/drawing/2014/main" id="{85491A40-666E-DF95-B13F-E0E67523FFB2}"/>
+              </a:ext>
+            </a:extLst>
+          </p:cNvPr>
+          <p:cNvSpPr>
+            <a:spLocks noChangeArrowheads="1"/>
+          </p:cNvSpPr>
+          <p:nvPr/>
+        </p:nvSpPr>
+        <p:spPr bwMode="auto">
+          <a:xfrm>
+            <a:off x="10621543" y="3456668"/>
+            <a:ext cx="2672206" cy="2154436"/>
+          </a:xfrm>
+          <a:prstGeom prst="rect">
+            <a:avLst/>
+          </a:prstGeom>
+          <a:solidFill>
+            <a:srgbClr val="FFFFFF"/>
+          </a:solidFill>
+          <a:ln>
+            <a:noFill/>
+          </a:ln>
+          <a:effectLst/>
+          <a:extLst>
+            <a:ext uri="{91240B29-F687-4F45-9708-019B960494DF}">
+              <a14:hiddenLine xmlns:a14="http://schemas.microsoft.com/office/drawing/2010/main" w="9525">
+                <a:solidFill>
+                  <a:schemeClr val="tx1"/>
+                </a:solidFill>
+                <a:miter lim="800000"/>
+                <a:headEnd/>
+                <a:tailEnd/>
+              </a14:hiddenLine>
+            </a:ext>
+            <a:ext uri="{AF507438-7753-43E0-B8FC-AC1667EBCBE1}">
+              <a14:hiddenEffects xmlns:a14="http://schemas.microsoft.com/office/drawing/2010/main">
+                <a:effectLst>
+                  <a:outerShdw dist="35921" dir="2700000" algn="ctr" rotWithShape="0">
+                    <a:schemeClr val="bg2"/>
+                  </a:outerShdw>
+                </a:effectLst>
+              </a14:hiddenEffects>
+            </a:ext>
+          </a:extLst>
+        </p:spPr>
+        <p:txBody>
+          <a:bodyPr vert="horz" wrap="none" lIns="0" tIns="0" rIns="0" bIns="0" numCol="1" anchor="ctr" anchorCtr="0" compatLnSpc="1">
+            <a:prstTxWarp prst="textNoShape">
+              <a:avLst/>
+            </a:prstTxWarp>
+            <a:spAutoFit/>
+          </a:bodyPr>
+          <a:lstStyle/>
+          <a:p>
+            <a:pPr marL="0" marR="0" lvl="0" indent="0" algn="l" defTabSz="914400" rtl="0" eaLnBrk="0" fontAlgn="base" latinLnBrk="0" hangingPunct="0">
+              <a:lnSpc>
+                <a:spcPct val="100000"/>
+              </a:lnSpc>
+              <a:spcBef>
+                <a:spcPct val="0"/>
+              </a:spcBef>
+              <a:spcAft>
+                <a:spcPct val="0"/>
+              </a:spcAft>
+              <a:buClrTx/>
+              <a:buSzTx/>
+              <a:buFontTx/>
+              <a:buNone/>
+              <a:tabLst/>
+            </a:pPr>
+            <a:r>
+              <a:rPr kumimoji="0" lang="en-US" altLang="en-US" sz="2000" b="0" i="0" u="none" strike="noStrike" cap="none" normalizeH="0" baseline="0" dirty="0">
+                <a:ln>
+                  <a:noFill/>
+                </a:ln>
+                <a:solidFill>
+                  <a:schemeClr val="tx1"/>
+                </a:solidFill>
+                <a:effectLst/>
+                <a:latin typeface="Montserrat" pitchFamily="2" charset="0"/>
+              </a:rPr>
+              <a:t>Baseline </a:t>
+            </a:r>
+          </a:p>
+          <a:p>
+            <a:pPr marL="0" marR="0" lvl="0" indent="0" algn="l" defTabSz="914400" rtl="0" eaLnBrk="0" fontAlgn="base" latinLnBrk="0" hangingPunct="0">
+              <a:lnSpc>
+                <a:spcPct val="100000"/>
+              </a:lnSpc>
+              <a:spcBef>
+                <a:spcPct val="0"/>
+              </a:spcBef>
+              <a:spcAft>
+                <a:spcPct val="0"/>
+              </a:spcAft>
+              <a:buClrTx/>
+              <a:buSzTx/>
+              <a:buFontTx/>
+              <a:buNone/>
+              <a:tabLst/>
+            </a:pPr>
+            <a:r>
+              <a:rPr lang="en-US" altLang="en-US" sz="2000" dirty="0">
+                <a:solidFill>
+                  <a:schemeClr val="tx1"/>
+                </a:solidFill>
+                <a:latin typeface="Montserrat" pitchFamily="2" charset="0"/>
+              </a:rPr>
+              <a:t>Shoes </a:t>
+            </a:r>
+            <a:r>
+              <a:rPr kumimoji="0" lang="en-US" altLang="en-US" sz="2000" b="0" i="0" u="none" strike="noStrike" cap="none" normalizeH="0" baseline="0" dirty="0">
+                <a:ln>
+                  <a:noFill/>
+                </a:ln>
+                <a:solidFill>
+                  <a:schemeClr val="tx1"/>
+                </a:solidFill>
+                <a:effectLst/>
+                <a:latin typeface="Montserrat" pitchFamily="2" charset="0"/>
+              </a:rPr>
+              <a:t>48.83 51.17 </a:t>
+            </a:r>
+          </a:p>
+          <a:p>
+            <a:pPr marL="0" marR="0" lvl="0" indent="0" algn="l" defTabSz="914400" rtl="0" eaLnBrk="0" fontAlgn="base" latinLnBrk="0" hangingPunct="0">
+              <a:lnSpc>
+                <a:spcPct val="100000"/>
+              </a:lnSpc>
+              <a:spcBef>
+                <a:spcPct val="0"/>
+              </a:spcBef>
+              <a:spcAft>
+                <a:spcPct val="0"/>
+              </a:spcAft>
+              <a:buClrTx/>
+              <a:buSzTx/>
+              <a:buFontTx/>
+              <a:buNone/>
+              <a:tabLst/>
+            </a:pPr>
+            <a:r>
+              <a:rPr lang="en-US" altLang="en-US" sz="2000" dirty="0">
+                <a:solidFill>
+                  <a:schemeClr val="tx1"/>
+                </a:solidFill>
+                <a:latin typeface="Montserrat" pitchFamily="2" charset="0"/>
+              </a:rPr>
+              <a:t>Barefoot: </a:t>
+            </a:r>
+            <a:r>
+              <a:rPr kumimoji="0" lang="en-US" altLang="en-US" sz="2000" b="0" i="0" u="none" strike="noStrike" cap="none" normalizeH="0" baseline="0" dirty="0">
+                <a:ln>
+                  <a:noFill/>
+                </a:ln>
+                <a:solidFill>
+                  <a:schemeClr val="tx1"/>
+                </a:solidFill>
+                <a:effectLst/>
+                <a:latin typeface="Montserrat" pitchFamily="2" charset="0"/>
+              </a:rPr>
+              <a:t>49.4 50.6 </a:t>
+            </a:r>
+          </a:p>
+          <a:p>
+            <a:pPr marL="0" marR="0" lvl="0" indent="0" algn="l" defTabSz="914400" rtl="0" eaLnBrk="0" fontAlgn="base" latinLnBrk="0" hangingPunct="0">
+              <a:lnSpc>
+                <a:spcPct val="100000"/>
+              </a:lnSpc>
+              <a:spcBef>
+                <a:spcPct val="0"/>
+              </a:spcBef>
+              <a:spcAft>
+                <a:spcPct val="0"/>
+              </a:spcAft>
+              <a:buClrTx/>
+              <a:buSzTx/>
+              <a:buFontTx/>
+              <a:buNone/>
+              <a:tabLst/>
+            </a:pPr>
+            <a:endParaRPr lang="en-US" altLang="en-US" sz="2000" dirty="0">
+              <a:solidFill>
+                <a:schemeClr val="tx1"/>
+              </a:solidFill>
+              <a:latin typeface="Montserrat" pitchFamily="2" charset="0"/>
+            </a:endParaRPr>
+          </a:p>
+          <a:p>
+            <a:pPr marL="0" marR="0" lvl="0" indent="0" algn="l" defTabSz="914400" rtl="0" eaLnBrk="0" fontAlgn="base" latinLnBrk="0" hangingPunct="0">
+              <a:lnSpc>
+                <a:spcPct val="100000"/>
+              </a:lnSpc>
+              <a:spcBef>
+                <a:spcPct val="0"/>
+              </a:spcBef>
+              <a:spcAft>
+                <a:spcPct val="0"/>
+              </a:spcAft>
+              <a:buClrTx/>
+              <a:buSzTx/>
+              <a:buFontTx/>
+              <a:buNone/>
+              <a:tabLst/>
+            </a:pPr>
+            <a:r>
+              <a:rPr kumimoji="0" lang="en-US" altLang="en-US" sz="2000" b="0" i="0" u="none" strike="noStrike" cap="none" normalizeH="0" baseline="0" dirty="0">
+                <a:ln>
+                  <a:noFill/>
+                </a:ln>
+                <a:solidFill>
+                  <a:schemeClr val="tx1"/>
+                </a:solidFill>
+                <a:effectLst/>
+                <a:latin typeface="Montserrat" pitchFamily="2" charset="0"/>
+              </a:rPr>
+              <a:t>Flight </a:t>
+            </a:r>
+          </a:p>
+          <a:p>
+            <a:pPr marL="0" marR="0" lvl="0" indent="0" algn="l" defTabSz="914400" rtl="0" eaLnBrk="0" fontAlgn="base" latinLnBrk="0" hangingPunct="0">
+              <a:lnSpc>
+                <a:spcPct val="100000"/>
+              </a:lnSpc>
+              <a:spcBef>
+                <a:spcPct val="0"/>
+              </a:spcBef>
+              <a:spcAft>
+                <a:spcPct val="0"/>
+              </a:spcAft>
+              <a:buClrTx/>
+              <a:buSzTx/>
+              <a:buFontTx/>
+              <a:buNone/>
+              <a:tabLst/>
+            </a:pPr>
+            <a:r>
+              <a:rPr lang="en-US" altLang="en-US" sz="2000" dirty="0">
+                <a:solidFill>
+                  <a:schemeClr val="tx1"/>
+                </a:solidFill>
+                <a:latin typeface="Montserrat" pitchFamily="2" charset="0"/>
+              </a:rPr>
+              <a:t>Shoes: </a:t>
+            </a:r>
+            <a:r>
+              <a:rPr kumimoji="0" lang="en-US" altLang="en-US" sz="2000" b="0" i="0" u="none" strike="noStrike" cap="none" normalizeH="0" baseline="0" dirty="0">
+                <a:ln>
+                  <a:noFill/>
+                </a:ln>
+                <a:solidFill>
+                  <a:schemeClr val="tx1"/>
+                </a:solidFill>
+                <a:effectLst/>
+                <a:latin typeface="Montserrat" pitchFamily="2" charset="0"/>
+              </a:rPr>
+              <a:t>50.03 49.97 </a:t>
+            </a:r>
+          </a:p>
+          <a:p>
+            <a:pPr marL="0" marR="0" lvl="0" indent="0" algn="l" defTabSz="914400" rtl="0" eaLnBrk="0" fontAlgn="base" latinLnBrk="0" hangingPunct="0">
+              <a:lnSpc>
+                <a:spcPct val="100000"/>
+              </a:lnSpc>
+              <a:spcBef>
+                <a:spcPct val="0"/>
+              </a:spcBef>
+              <a:spcAft>
+                <a:spcPct val="0"/>
+              </a:spcAft>
+              <a:buClrTx/>
+              <a:buSzTx/>
+              <a:buFontTx/>
+              <a:buNone/>
+              <a:tabLst/>
+            </a:pPr>
+            <a:r>
+              <a:rPr lang="en-US" altLang="en-US" sz="2000" dirty="0">
+                <a:solidFill>
+                  <a:schemeClr val="tx1"/>
+                </a:solidFill>
+                <a:latin typeface="Montserrat" pitchFamily="2" charset="0"/>
+              </a:rPr>
+              <a:t>Barefoot: </a:t>
+            </a:r>
+            <a:r>
+              <a:rPr kumimoji="0" lang="en-US" altLang="en-US" sz="2000" b="0" i="0" u="none" strike="noStrike" cap="none" normalizeH="0" baseline="0" dirty="0">
+                <a:ln>
+                  <a:noFill/>
+                </a:ln>
+                <a:solidFill>
+                  <a:schemeClr val="tx1"/>
+                </a:solidFill>
+                <a:effectLst/>
+                <a:latin typeface="Montserrat" pitchFamily="2" charset="0"/>
+              </a:rPr>
+              <a:t>49.87 50.13 </a:t>
+            </a:r>
+          </a:p>
+        </p:txBody>
+      </p:sp>
+    </p:spTree>
+    <p:extLst>
+      <p:ext uri="{BB962C8B-B14F-4D97-AF65-F5344CB8AC3E}">
+        <p14:creationId xmlns:p14="http://schemas.microsoft.com/office/powerpoint/2010/main" val="1943121691"/>
+      </p:ext>
+    </p:extLst>
+  </p:cSld>
+  <p:clrMapOvr>
+    <a:masterClrMapping/>
+  </p:clrMapOvr>
+  <p:transition spd="med"/>
+</p:sld>
+</file>
+
+<file path=ppt/slides/slide5.xml><?xml version="1.0" encoding="utf-8"?>
+<p:sld xmlns:a="http://schemas.openxmlformats.org/drawingml/2006/main" xmlns:r="http://schemas.openxmlformats.org/officeDocument/2006/relationships" xmlns:p="http://schemas.openxmlformats.org/presentationml/2006/main">
+  <p:cSld>
+    <p:spTree>
+      <p:nvGrpSpPr>
+        <p:cNvPr id="1" name="">
+          <a:extLst>
+            <a:ext uri="{FF2B5EF4-FFF2-40B4-BE49-F238E27FC236}">
               <a16:creationId xmlns:a16="http://schemas.microsoft.com/office/drawing/2014/main" id="{8C9334F5-6CAA-4C9C-FE44-1EF01AD29DD0}"/>
             </a:ext>
           </a:extLst>
@@ -8057,7 +9148,7 @@
 </p:sld>
 </file>
 
-<file path=ppt/slides/slide5.xml><?xml version="1.0" encoding="utf-8"?>
+<file path=ppt/slides/slide6.xml><?xml version="1.0" encoding="utf-8"?>
 <p:sld xmlns:a="http://schemas.openxmlformats.org/drawingml/2006/main" xmlns:r="http://schemas.openxmlformats.org/officeDocument/2006/relationships" xmlns:p="http://schemas.openxmlformats.org/presentationml/2006/main">
   <p:cSld>
     <p:spTree>
@@ -8636,6 +9727,36 @@
           <a:xfrm>
             <a:off x="5410697" y="8000009"/>
             <a:ext cx="14108494" cy="4791744"/>
+          </a:xfrm>
+          <a:prstGeom prst="rect">
+            <a:avLst/>
+          </a:prstGeom>
+        </p:spPr>
+      </p:pic>
+      <p:pic>
+        <p:nvPicPr>
+          <p:cNvPr id="6" name="Picture 5">
+            <a:extLst>
+              <a:ext uri="{FF2B5EF4-FFF2-40B4-BE49-F238E27FC236}">
+                <a16:creationId xmlns:a16="http://schemas.microsoft.com/office/drawing/2014/main" id="{DAF0D51A-712F-8872-DC0E-91D718AF6A5C}"/>
+              </a:ext>
+            </a:extLst>
+          </p:cNvPr>
+          <p:cNvPicPr>
+            <a:picLocks noChangeAspect="1"/>
+          </p:cNvPicPr>
+          <p:nvPr/>
+        </p:nvPicPr>
+        <p:blipFill>
+          <a:blip r:embed="rId8"/>
+          <a:stretch>
+            <a:fillRect/>
+          </a:stretch>
+        </p:blipFill>
+        <p:spPr>
+          <a:xfrm>
+            <a:off x="5623596" y="4619312"/>
+            <a:ext cx="13136808" cy="4477375"/>
           </a:xfrm>
           <a:prstGeom prst="rect">
             <a:avLst/>

</xml_diff>